<commit_message>
Added pdf of slides
</commit_message>
<xml_diff>
--- a/ietf115/chair-slides.pptx
+++ b/ietf115/chair-slides.pptx
@@ -176,7 +176,7 @@
           <a:p>
             <a:fld id="{1D8BD707-D9CF-40AE-B4C6-C98DA3205C09}" type="datetimeFigureOut">
               <a:rPr lang="en-US"/>
-              <a:t>11/6/2022</a:t>
+              <a:t>11/7/2022</a:t>
             </a:fld>
             <a:endParaRPr lang="en-US"/>
           </a:p>
@@ -353,7 +353,7 @@
           <a:p>
             <a:fld id="{1D8BD707-D9CF-40AE-B4C6-C98DA3205C09}" type="datetimeFigureOut">
               <a:rPr lang="en-US"/>
-              <a:t>11/6/2022</a:t>
+              <a:t>11/7/2022</a:t>
             </a:fld>
             <a:endParaRPr lang="en-US"/>
           </a:p>
@@ -567,7 +567,7 @@
           <a:p>
             <a:fld id="{1D8BD707-D9CF-40AE-B4C6-C98DA3205C09}" type="datetimeFigureOut">
               <a:rPr lang="en-US"/>
-              <a:t>11/6/2022</a:t>
+              <a:t>11/7/2022</a:t>
             </a:fld>
             <a:endParaRPr lang="en-US"/>
           </a:p>
@@ -715,7 +715,7 @@
           <a:p>
             <a:fld id="{1D8BD707-D9CF-40AE-B4C6-C98DA3205C09}" type="datetimeFigureOut">
               <a:rPr lang="en-US"/>
-              <a:t>11/6/2022</a:t>
+              <a:t>11/7/2022</a:t>
             </a:fld>
             <a:endParaRPr lang="en-US"/>
           </a:p>
@@ -834,7 +834,7 @@
           <a:p>
             <a:fld id="{1D8BD707-D9CF-40AE-B4C6-C98DA3205C09}" type="datetimeFigureOut">
               <a:rPr lang="en-US"/>
-              <a:t>11/6/2022</a:t>
+              <a:t>11/7/2022</a:t>
             </a:fld>
             <a:endParaRPr lang="en-US"/>
           </a:p>
@@ -1109,7 +1109,7 @@
           <a:p>
             <a:fld id="{1D8BD707-D9CF-40AE-B4C6-C98DA3205C09}" type="datetimeFigureOut">
               <a:rPr lang="en-US"/>
-              <a:t>11/6/2022</a:t>
+              <a:t>11/7/2022</a:t>
             </a:fld>
             <a:endParaRPr lang="en-US"/>
           </a:p>

</xml_diff>